<commit_message>
Clean Quarto rebuild for Stats II Spring 2026
</commit_message>
<xml_diff>
--- a/_book/slides/R labs/lab_1-sp2025.pptx
+++ b/_book/slides/R labs/lab_1-sp2025.pptx
@@ -155,14 +155,6 @@
     </p:ext>
   </p:extLst>
 </p:presentation>
-</file>
-
-<file path=ppt/revisionInfo.xml><?xml version="1.0" encoding="utf-8"?>
-<p1510:revInfo xmlns:a="http://schemas.openxmlformats.org/drawingml/2006/main" xmlns:r="http://schemas.openxmlformats.org/officeDocument/2006/relationships" xmlns:p1510="http://schemas.microsoft.com/office/powerpoint/2015/10/main">
-  <p1510:revLst>
-    <p1510:client id="{0005CF7D-5C79-4137-9CAB-E5BB760F2351}" v="259" dt="2025-01-16T00:47:24.613"/>
-  </p1510:revLst>
-</p1510:revInfo>
 </file>
 
 <file path=ppt/diagrams/colors1.xml><?xml version="1.0" encoding="utf-8"?>
@@ -33242,7 +33234,7 @@
             <p:ph idx="1"/>
             <p:extLst>
               <p:ext uri="{D42A27DB-BD31-4B8C-83A1-F6EECF244321}">
-                <p14:modId xmlns:p14="http://schemas.microsoft.com/office/powerpoint/2010/main" val="4061291603"/>
+                <p14:modId xmlns:p14="http://schemas.microsoft.com/office/powerpoint/2010/main" val="3987749118"/>
               </p:ext>
             </p:extLst>
           </p:nvPr>
@@ -33304,7 +33296,7 @@
                           </a:solidFill>
                           <a:effectLst/>
                         </a:rPr>
-                        <a:t>Main Sources of Spatially Referenced Data</a:t>
+                        <a:t>Sources of Spatially Referenced Data</a:t>
                       </a:r>
                       <a:endParaRPr lang="en-US" sz="2800" b="1" kern="100" cap="none" spc="0" dirty="0">
                         <a:solidFill>

</xml_diff>